<commit_message>
First version of 'Why Quarto' section
</commit_message>
<xml_diff>
--- a/docs/using-quarto-ppt.pptx
+++ b/docs/using-quarto-ppt.pptx
@@ -20,6 +20,11 @@
     <p:sldId id="268" r:id="rId14"/>
     <p:sldId id="269" r:id="rId15"/>
     <p:sldId id="270" r:id="rId16"/>
+    <p:sldId id="271" r:id="rId17"/>
+    <p:sldId id="272" r:id="rId18"/>
+    <p:sldId id="273" r:id="rId19"/>
+    <p:sldId id="274" r:id="rId20"/>
+    <p:sldId id="275" r:id="rId21"/>
   </p:sldIdLst>
   <p:sldSz cx="9144000" cy="5143500" type="screen16x9"/>
   <p:notesSz cx="6858000" cy="9144000"/>
@@ -4103,13 +4108,7 @@
       </p:grpSpPr>
       <p:sp>
         <p:nvSpPr>
-          <p:cNvPr id="9" name="Title 1">
-            <a:extLst>
-              <a:ext uri="{FF2B5EF4-FFF2-40B4-BE49-F238E27FC236}">
-                <a16:creationId xmlns:a16="http://schemas.microsoft.com/office/drawing/2014/main" id="{039B6DB2-D068-C680-F293-31EEF2D13404}"/>
-              </a:ext>
-            </a:extLst>
-          </p:cNvPr>
+          <p:cNvPr id="2" name="Title 1"/>
           <p:cNvSpPr>
             <a:spLocks noGrp="1"/>
           </p:cNvSpPr>
@@ -4117,12 +4116,7 @@
             <p:ph type="title"/>
           </p:nvPr>
         </p:nvSpPr>
-        <p:spPr>
-          <a:xfrm>
-            <a:off x="457200" y="205979"/>
-            <a:ext cx="8229600" cy="857250"/>
-          </a:xfrm>
-        </p:spPr>
+        <p:spPr/>
         <p:txBody>
           <a:bodyPr/>
           <a:lstStyle/>
@@ -4132,19 +4126,19 @@
             </a:pPr>
             <a:r>
               <a:rPr/>
-              <a:t>What if I want to add code?</a:t>
-            </a:r>
-          </a:p>
-        </p:txBody>
-      </p:sp>
-      <p:sp>
-        <p:nvSpPr>
-          <p:cNvPr id="4" name="Text Placeholder 3"/>
-          <p:cNvSpPr>
-            <a:spLocks noGrp="1"/>
-          </p:cNvSpPr>
-          <p:nvPr>
-            <p:ph idx="2" sz="half" type="body"/>
+              <a:t>The basics</a:t>
+            </a:r>
+          </a:p>
+        </p:txBody>
+      </p:sp>
+      <p:sp>
+        <p:nvSpPr>
+          <p:cNvPr id="3" name="Content Placeholder 2"/>
+          <p:cNvSpPr>
+            <a:spLocks noGrp="1"/>
+          </p:cNvSpPr>
+          <p:nvPr>
+            <p:ph idx="1" sz="half"/>
           </p:nvPr>
         </p:nvSpPr>
         <p:spPr/>
@@ -4152,465 +4146,102 @@
           <a:bodyPr/>
           <a:lstStyle/>
           <a:p>
-            <a:pPr lvl="0" indent="0">
+            <a:pPr lvl="0" indent="0" marL="0">
               <a:buNone/>
             </a:pPr>
             <a:r>
+              <a:rPr/>
+              <a:t>Whether you use Quarto from </a:t>
+            </a:r>
+            <a:r>
               <a:rPr>
-                <a:solidFill>
-                  <a:srgbClr val="00769E"/>
-                </a:solidFill>
                 <a:latin typeface="Courier"/>
               </a:rPr>
-              <a:t>import</a:t>
+              <a:t>.qmd</a:t>
+            </a:r>
+            <a:r>
+              <a:rPr/>
+              <a:t>, </a:t>
             </a:r>
             <a:r>
               <a:rPr>
-                <a:solidFill>
-                  <a:srgbClr val="003B4F"/>
-                </a:solidFill>
                 <a:latin typeface="Courier"/>
               </a:rPr>
-              <a:t> numpy </a:t>
+              <a:t>.ipynb</a:t>
+            </a:r>
+            <a:r>
+              <a:rPr/>
+              <a:t>, or </a:t>
             </a:r>
             <a:r>
               <a:rPr>
-                <a:solidFill>
-                  <a:srgbClr val="00769E"/>
-                </a:solidFill>
                 <a:latin typeface="Courier"/>
               </a:rPr>
-              <a:t>as</a:t>
+              <a:t>.Rmd</a:t>
+            </a:r>
+            <a:r>
+              <a:rPr/>
+              <a:t> files, you always start with a YAML front-matter file.</a:t>
+            </a:r>
+          </a:p>
+          <a:p>
+            <a:pPr lvl="0" indent="0" marL="0">
+              <a:buNone/>
+            </a:pPr>
+            <a:r>
+              <a:rPr/>
+              <a:t>The YAML configuration determines what’s the output format of your document. A few popular output options are </a:t>
             </a:r>
             <a:r>
               <a:rPr>
-                <a:solidFill>
-                  <a:srgbClr val="003B4F"/>
-                </a:solidFill>
                 <a:latin typeface="Courier"/>
               </a:rPr>
-              <a:t> np</a:t>
-            </a:r>
-            <a:br/>
+              <a:t>html</a:t>
+            </a:r>
+            <a:r>
+              <a:rPr/>
+              <a:t>, </a:t>
+            </a:r>
             <a:r>
               <a:rPr>
-                <a:solidFill>
-                  <a:srgbClr val="00769E"/>
-                </a:solidFill>
                 <a:latin typeface="Courier"/>
               </a:rPr>
-              <a:t>import</a:t>
+              <a:t>pptx</a:t>
+            </a:r>
+            <a:r>
+              <a:rPr/>
+              <a:t>, </a:t>
             </a:r>
             <a:r>
               <a:rPr>
-                <a:solidFill>
-                  <a:srgbClr val="003B4F"/>
-                </a:solidFill>
                 <a:latin typeface="Courier"/>
               </a:rPr>
-              <a:t> matplotlib.pyplot </a:t>
+              <a:t>docx</a:t>
+            </a:r>
+            <a:r>
+              <a:rPr/>
+              <a:t>, and </a:t>
             </a:r>
             <a:r>
               <a:rPr>
-                <a:solidFill>
-                  <a:srgbClr val="00769E"/>
-                </a:solidFill>
                 <a:latin typeface="Courier"/>
               </a:rPr>
-              <a:t>as</a:t>
-            </a:r>
-            <a:r>
-              <a:rPr>
-                <a:solidFill>
-                  <a:srgbClr val="003B4F"/>
-                </a:solidFill>
-                <a:latin typeface="Courier"/>
-              </a:rPr>
-              <a:t> plt</a:t>
-            </a:r>
-            <a:br/>
-            <a:br/>
-            <a:r>
-              <a:rPr>
-                <a:solidFill>
-                  <a:srgbClr val="003B4F"/>
-                </a:solidFill>
-                <a:latin typeface="Courier"/>
-              </a:rPr>
-              <a:t>r </a:t>
-            </a:r>
-            <a:r>
-              <a:rPr>
-                <a:solidFill>
-                  <a:srgbClr val="5E5E5E"/>
-                </a:solidFill>
-                <a:latin typeface="Courier"/>
-              </a:rPr>
-              <a:t>=</a:t>
-            </a:r>
-            <a:r>
-              <a:rPr>
-                <a:solidFill>
-                  <a:srgbClr val="003B4F"/>
-                </a:solidFill>
-                <a:latin typeface="Courier"/>
-              </a:rPr>
-              <a:t> np.arange(</a:t>
-            </a:r>
-            <a:r>
-              <a:rPr>
-                <a:solidFill>
-                  <a:srgbClr val="AD0000"/>
-                </a:solidFill>
-                <a:latin typeface="Courier"/>
-              </a:rPr>
-              <a:t>0</a:t>
-            </a:r>
-            <a:r>
-              <a:rPr>
-                <a:solidFill>
-                  <a:srgbClr val="003B4F"/>
-                </a:solidFill>
-                <a:latin typeface="Courier"/>
-              </a:rPr>
-              <a:t>, </a:t>
-            </a:r>
-            <a:r>
-              <a:rPr>
-                <a:solidFill>
-                  <a:srgbClr val="AD0000"/>
-                </a:solidFill>
-                <a:latin typeface="Courier"/>
-              </a:rPr>
-              <a:t>2</a:t>
-            </a:r>
-            <a:r>
-              <a:rPr>
-                <a:solidFill>
-                  <a:srgbClr val="003B4F"/>
-                </a:solidFill>
-                <a:latin typeface="Courier"/>
-              </a:rPr>
-              <a:t>, </a:t>
-            </a:r>
-            <a:r>
-              <a:rPr>
-                <a:solidFill>
-                  <a:srgbClr val="AD0000"/>
-                </a:solidFill>
-                <a:latin typeface="Courier"/>
-              </a:rPr>
-              <a:t>0.01</a:t>
-            </a:r>
-            <a:r>
-              <a:rPr>
-                <a:solidFill>
-                  <a:srgbClr val="003B4F"/>
-                </a:solidFill>
-                <a:latin typeface="Courier"/>
-              </a:rPr>
-              <a:t>)</a:t>
-            </a:r>
-            <a:br/>
-            <a:r>
-              <a:rPr>
-                <a:solidFill>
-                  <a:srgbClr val="003B4F"/>
-                </a:solidFill>
-                <a:latin typeface="Courier"/>
-              </a:rPr>
-              <a:t>theta </a:t>
-            </a:r>
-            <a:r>
-              <a:rPr>
-                <a:solidFill>
-                  <a:srgbClr val="5E5E5E"/>
-                </a:solidFill>
-                <a:latin typeface="Courier"/>
-              </a:rPr>
-              <a:t>=</a:t>
-            </a:r>
-            <a:r>
-              <a:rPr>
-                <a:solidFill>
-                  <a:srgbClr val="003B4F"/>
-                </a:solidFill>
-                <a:latin typeface="Courier"/>
-              </a:rPr>
-              <a:t> </a:t>
-            </a:r>
-            <a:r>
-              <a:rPr>
-                <a:solidFill>
-                  <a:srgbClr val="AD0000"/>
-                </a:solidFill>
-                <a:latin typeface="Courier"/>
-              </a:rPr>
-              <a:t>2</a:t>
-            </a:r>
-            <a:r>
-              <a:rPr>
-                <a:solidFill>
-                  <a:srgbClr val="003B4F"/>
-                </a:solidFill>
-                <a:latin typeface="Courier"/>
-              </a:rPr>
-              <a:t> </a:t>
-            </a:r>
-            <a:r>
-              <a:rPr>
-                <a:solidFill>
-                  <a:srgbClr val="5E5E5E"/>
-                </a:solidFill>
-                <a:latin typeface="Courier"/>
-              </a:rPr>
-              <a:t>*</a:t>
-            </a:r>
-            <a:r>
-              <a:rPr>
-                <a:solidFill>
-                  <a:srgbClr val="003B4F"/>
-                </a:solidFill>
-                <a:latin typeface="Courier"/>
-              </a:rPr>
-              <a:t> np.pi </a:t>
-            </a:r>
-            <a:r>
-              <a:rPr>
-                <a:solidFill>
-                  <a:srgbClr val="5E5E5E"/>
-                </a:solidFill>
-                <a:latin typeface="Courier"/>
-              </a:rPr>
-              <a:t>*</a:t>
-            </a:r>
-            <a:r>
-              <a:rPr>
-                <a:solidFill>
-                  <a:srgbClr val="003B4F"/>
-                </a:solidFill>
-                <a:latin typeface="Courier"/>
-              </a:rPr>
-              <a:t> r</a:t>
-            </a:r>
-            <a:br/>
-            <a:r>
-              <a:rPr>
-                <a:solidFill>
-                  <a:srgbClr val="003B4F"/>
-                </a:solidFill>
-                <a:latin typeface="Courier"/>
-              </a:rPr>
-              <a:t>fig, ax </a:t>
-            </a:r>
-            <a:r>
-              <a:rPr>
-                <a:solidFill>
-                  <a:srgbClr val="5E5E5E"/>
-                </a:solidFill>
-                <a:latin typeface="Courier"/>
-              </a:rPr>
-              <a:t>=</a:t>
-            </a:r>
-            <a:r>
-              <a:rPr>
-                <a:solidFill>
-                  <a:srgbClr val="003B4F"/>
-                </a:solidFill>
-                <a:latin typeface="Courier"/>
-              </a:rPr>
-              <a:t> plt.subplots(subplot_kw</a:t>
-            </a:r>
-            <a:r>
-              <a:rPr>
-                <a:solidFill>
-                  <a:srgbClr val="5E5E5E"/>
-                </a:solidFill>
-                <a:latin typeface="Courier"/>
-              </a:rPr>
-              <a:t>=</a:t>
-            </a:r>
-            <a:r>
-              <a:rPr>
-                <a:solidFill>
-                  <a:srgbClr val="003B4F"/>
-                </a:solidFill>
-                <a:latin typeface="Courier"/>
-              </a:rPr>
-              <a:t>{</a:t>
-            </a:r>
-            <a:r>
-              <a:rPr>
-                <a:solidFill>
-                  <a:srgbClr val="20794D"/>
-                </a:solidFill>
-                <a:latin typeface="Courier"/>
-              </a:rPr>
-              <a:t>'projection'</a:t>
-            </a:r>
-            <a:r>
-              <a:rPr>
-                <a:solidFill>
-                  <a:srgbClr val="003B4F"/>
-                </a:solidFill>
-                <a:latin typeface="Courier"/>
-              </a:rPr>
-              <a:t>: </a:t>
-            </a:r>
-            <a:r>
-              <a:rPr>
-                <a:solidFill>
-                  <a:srgbClr val="20794D"/>
-                </a:solidFill>
-                <a:latin typeface="Courier"/>
-              </a:rPr>
-              <a:t>'polar'</a:t>
-            </a:r>
-            <a:r>
-              <a:rPr>
-                <a:solidFill>
-                  <a:srgbClr val="003B4F"/>
-                </a:solidFill>
-                <a:latin typeface="Courier"/>
-              </a:rPr>
-              <a:t>})</a:t>
-            </a:r>
-            <a:br/>
-            <a:r>
-              <a:rPr>
-                <a:solidFill>
-                  <a:srgbClr val="003B4F"/>
-                </a:solidFill>
-                <a:latin typeface="Courier"/>
-              </a:rPr>
-              <a:t>ax.plot(theta, r)</a:t>
-            </a:r>
-            <a:br/>
-            <a:r>
-              <a:rPr>
-                <a:solidFill>
-                  <a:srgbClr val="003B4F"/>
-                </a:solidFill>
-                <a:latin typeface="Courier"/>
-              </a:rPr>
-              <a:t>ax.set_rticks([</a:t>
-            </a:r>
-            <a:r>
-              <a:rPr>
-                <a:solidFill>
-                  <a:srgbClr val="AD0000"/>
-                </a:solidFill>
-                <a:latin typeface="Courier"/>
-              </a:rPr>
-              <a:t>0.5</a:t>
-            </a:r>
-            <a:r>
-              <a:rPr>
-                <a:solidFill>
-                  <a:srgbClr val="003B4F"/>
-                </a:solidFill>
-                <a:latin typeface="Courier"/>
-              </a:rPr>
-              <a:t>, </a:t>
-            </a:r>
-            <a:r>
-              <a:rPr>
-                <a:solidFill>
-                  <a:srgbClr val="AD0000"/>
-                </a:solidFill>
-                <a:latin typeface="Courier"/>
-              </a:rPr>
-              <a:t>1</a:t>
-            </a:r>
-            <a:r>
-              <a:rPr>
-                <a:solidFill>
-                  <a:srgbClr val="003B4F"/>
-                </a:solidFill>
-                <a:latin typeface="Courier"/>
-              </a:rPr>
-              <a:t>, </a:t>
-            </a:r>
-            <a:r>
-              <a:rPr>
-                <a:solidFill>
-                  <a:srgbClr val="AD0000"/>
-                </a:solidFill>
-                <a:latin typeface="Courier"/>
-              </a:rPr>
-              <a:t>1.5</a:t>
-            </a:r>
-            <a:r>
-              <a:rPr>
-                <a:solidFill>
-                  <a:srgbClr val="003B4F"/>
-                </a:solidFill>
-                <a:latin typeface="Courier"/>
-              </a:rPr>
-              <a:t>, </a:t>
-            </a:r>
-            <a:r>
-              <a:rPr>
-                <a:solidFill>
-                  <a:srgbClr val="AD0000"/>
-                </a:solidFill>
-                <a:latin typeface="Courier"/>
-              </a:rPr>
-              <a:t>2</a:t>
-            </a:r>
-            <a:r>
-              <a:rPr>
-                <a:solidFill>
-                  <a:srgbClr val="003B4F"/>
-                </a:solidFill>
-                <a:latin typeface="Courier"/>
-              </a:rPr>
-              <a:t>])</a:t>
-            </a:r>
-            <a:br/>
-            <a:r>
-              <a:rPr>
-                <a:solidFill>
-                  <a:srgbClr val="003B4F"/>
-                </a:solidFill>
-                <a:latin typeface="Courier"/>
-              </a:rPr>
-              <a:t>ax.grid(</a:t>
-            </a:r>
-            <a:r>
-              <a:rPr>
-                <a:solidFill>
-                  <a:srgbClr val="111111"/>
-                </a:solidFill>
-                <a:latin typeface="Courier"/>
-              </a:rPr>
-              <a:t>True</a:t>
-            </a:r>
-            <a:r>
-              <a:rPr>
-                <a:solidFill>
-                  <a:srgbClr val="003B4F"/>
-                </a:solidFill>
-                <a:latin typeface="Courier"/>
-              </a:rPr>
-              <a:t>)</a:t>
-            </a:r>
-            <a:br/>
-            <a:r>
-              <a:rPr>
-                <a:solidFill>
-                  <a:srgbClr val="003B4F"/>
-                </a:solidFill>
-                <a:latin typeface="Courier"/>
-              </a:rPr>
-              <a:t>plt.show()</a:t>
+              <a:t>pdf</a:t>
+            </a:r>
+            <a:r>
+              <a:rPr/>
+              <a:t>. </a:t>
+            </a:r>
+            <a:r>
+              <a:rPr b="1"/>
+              <a:t>You can use a single source file to generate multiple output types.</a:t>
             </a:r>
           </a:p>
         </p:txBody>
       </p:sp>
       <p:pic>
         <p:nvPicPr>
-          <p:cNvPr descr="using-quarto-ppt_files/figure-pptx/cell-2-output-1.png" id="0" name="Picture 1"/>
+          <p:cNvPr descr="fig:  images/yaml-front-matter.png" id="0" name="Picture 1"/>
           <p:cNvPicPr>
             <a:picLocks noGrp="1" noChangeAspect="1"/>
           </p:cNvPicPr>
@@ -4624,8 +4255,8 @@
         </p:blipFill>
         <p:spPr bwMode="auto">
           <a:xfrm>
-            <a:off x="3048000" y="1689100"/>
-            <a:ext cx="3048000" cy="2984500"/>
+            <a:off x="4648200" y="1778000"/>
+            <a:ext cx="4038600" cy="1714500"/>
           </a:xfrm>
           <a:prstGeom prst="rect">
             <a:avLst/>
@@ -4638,6 +4269,36 @@
           </a:ln>
         </p:spPr>
       </p:pic>
+      <p:sp>
+        <p:nvSpPr>
+          <p:cNvPr id="1" name="TextBox 3"/>
+          <p:cNvSpPr txBox="1"/>
+          <p:nvPr/>
+        </p:nvSpPr>
+        <p:spPr>
+          <a:xfrm>
+            <a:off x="4648200" y="4076700"/>
+            <a:ext cx="4038600" cy="508000"/>
+          </a:xfrm>
+          <a:prstGeom prst="rect">
+            <a:avLst/>
+          </a:prstGeom>
+          <a:noFill/>
+        </p:spPr>
+        <p:txBody>
+          <a:bodyPr/>
+          <a:lstStyle/>
+          <a:p>
+            <a:pPr lvl="0" indent="0" marL="0" algn="ctr">
+              <a:buNone/>
+            </a:pPr>
+            <a:r>
+              <a:rPr/>
+              <a:t>YAML</a:t>
+            </a:r>
+          </a:p>
+        </p:txBody>
+      </p:sp>
     </p:spTree>
   </p:cSld>
 </p:sld>
@@ -4662,7 +4323,13 @@
       </p:grpSpPr>
       <p:sp>
         <p:nvSpPr>
-          <p:cNvPr id="2" name="Title 1"/>
+          <p:cNvPr id="9" name="Title 1">
+            <a:extLst>
+              <a:ext uri="{FF2B5EF4-FFF2-40B4-BE49-F238E27FC236}">
+                <a16:creationId xmlns:a16="http://schemas.microsoft.com/office/drawing/2014/main" id="{039B6DB2-D068-C680-F293-31EEF2D13404}"/>
+              </a:ext>
+            </a:extLst>
+          </p:cNvPr>
           <p:cNvSpPr>
             <a:spLocks noGrp="1"/>
           </p:cNvSpPr>
@@ -4672,8 +4339,8 @@
         </p:nvSpPr>
         <p:spPr>
           <a:xfrm>
-            <a:off x="722313" y="3305176"/>
-            <a:ext cx="7772400" cy="1021556"/>
+            <a:off x="457200" y="205979"/>
+            <a:ext cx="8229600" cy="857250"/>
           </a:xfrm>
         </p:spPr>
         <p:txBody>
@@ -4685,11 +4352,512 @@
             </a:pPr>
             <a:r>
               <a:rPr/>
-              <a:t>Presentations</a:t>
-            </a:r>
-          </a:p>
-        </p:txBody>
-      </p:sp>
+              <a:t>What if I want to add code?</a:t>
+            </a:r>
+          </a:p>
+        </p:txBody>
+      </p:sp>
+      <p:sp>
+        <p:nvSpPr>
+          <p:cNvPr id="4" name="Text Placeholder 3"/>
+          <p:cNvSpPr>
+            <a:spLocks noGrp="1"/>
+          </p:cNvSpPr>
+          <p:nvPr>
+            <p:ph idx="2" sz="half" type="body"/>
+          </p:nvPr>
+        </p:nvSpPr>
+        <p:spPr/>
+        <p:txBody>
+          <a:bodyPr/>
+          <a:lstStyle/>
+          <a:p>
+            <a:pPr lvl="0" indent="0">
+              <a:buNone/>
+            </a:pPr>
+            <a:r>
+              <a:rPr>
+                <a:solidFill>
+                  <a:srgbClr val="00769E"/>
+                </a:solidFill>
+                <a:latin typeface="Courier"/>
+              </a:rPr>
+              <a:t>import</a:t>
+            </a:r>
+            <a:r>
+              <a:rPr>
+                <a:solidFill>
+                  <a:srgbClr val="003B4F"/>
+                </a:solidFill>
+                <a:latin typeface="Courier"/>
+              </a:rPr>
+              <a:t> numpy </a:t>
+            </a:r>
+            <a:r>
+              <a:rPr>
+                <a:solidFill>
+                  <a:srgbClr val="00769E"/>
+                </a:solidFill>
+                <a:latin typeface="Courier"/>
+              </a:rPr>
+              <a:t>as</a:t>
+            </a:r>
+            <a:r>
+              <a:rPr>
+                <a:solidFill>
+                  <a:srgbClr val="003B4F"/>
+                </a:solidFill>
+                <a:latin typeface="Courier"/>
+              </a:rPr>
+              <a:t> np</a:t>
+            </a:r>
+            <a:br/>
+            <a:r>
+              <a:rPr>
+                <a:solidFill>
+                  <a:srgbClr val="00769E"/>
+                </a:solidFill>
+                <a:latin typeface="Courier"/>
+              </a:rPr>
+              <a:t>import</a:t>
+            </a:r>
+            <a:r>
+              <a:rPr>
+                <a:solidFill>
+                  <a:srgbClr val="003B4F"/>
+                </a:solidFill>
+                <a:latin typeface="Courier"/>
+              </a:rPr>
+              <a:t> matplotlib.pyplot </a:t>
+            </a:r>
+            <a:r>
+              <a:rPr>
+                <a:solidFill>
+                  <a:srgbClr val="00769E"/>
+                </a:solidFill>
+                <a:latin typeface="Courier"/>
+              </a:rPr>
+              <a:t>as</a:t>
+            </a:r>
+            <a:r>
+              <a:rPr>
+                <a:solidFill>
+                  <a:srgbClr val="003B4F"/>
+                </a:solidFill>
+                <a:latin typeface="Courier"/>
+              </a:rPr>
+              <a:t> plt</a:t>
+            </a:r>
+            <a:br/>
+            <a:br/>
+            <a:r>
+              <a:rPr>
+                <a:solidFill>
+                  <a:srgbClr val="003B4F"/>
+                </a:solidFill>
+                <a:latin typeface="Courier"/>
+              </a:rPr>
+              <a:t>r </a:t>
+            </a:r>
+            <a:r>
+              <a:rPr>
+                <a:solidFill>
+                  <a:srgbClr val="5E5E5E"/>
+                </a:solidFill>
+                <a:latin typeface="Courier"/>
+              </a:rPr>
+              <a:t>=</a:t>
+            </a:r>
+            <a:r>
+              <a:rPr>
+                <a:solidFill>
+                  <a:srgbClr val="003B4F"/>
+                </a:solidFill>
+                <a:latin typeface="Courier"/>
+              </a:rPr>
+              <a:t> np.arange(</a:t>
+            </a:r>
+            <a:r>
+              <a:rPr>
+                <a:solidFill>
+                  <a:srgbClr val="AD0000"/>
+                </a:solidFill>
+                <a:latin typeface="Courier"/>
+              </a:rPr>
+              <a:t>0</a:t>
+            </a:r>
+            <a:r>
+              <a:rPr>
+                <a:solidFill>
+                  <a:srgbClr val="003B4F"/>
+                </a:solidFill>
+                <a:latin typeface="Courier"/>
+              </a:rPr>
+              <a:t>, </a:t>
+            </a:r>
+            <a:r>
+              <a:rPr>
+                <a:solidFill>
+                  <a:srgbClr val="AD0000"/>
+                </a:solidFill>
+                <a:latin typeface="Courier"/>
+              </a:rPr>
+              <a:t>2</a:t>
+            </a:r>
+            <a:r>
+              <a:rPr>
+                <a:solidFill>
+                  <a:srgbClr val="003B4F"/>
+                </a:solidFill>
+                <a:latin typeface="Courier"/>
+              </a:rPr>
+              <a:t>, </a:t>
+            </a:r>
+            <a:r>
+              <a:rPr>
+                <a:solidFill>
+                  <a:srgbClr val="AD0000"/>
+                </a:solidFill>
+                <a:latin typeface="Courier"/>
+              </a:rPr>
+              <a:t>0.01</a:t>
+            </a:r>
+            <a:r>
+              <a:rPr>
+                <a:solidFill>
+                  <a:srgbClr val="003B4F"/>
+                </a:solidFill>
+                <a:latin typeface="Courier"/>
+              </a:rPr>
+              <a:t>)</a:t>
+            </a:r>
+            <a:br/>
+            <a:r>
+              <a:rPr>
+                <a:solidFill>
+                  <a:srgbClr val="003B4F"/>
+                </a:solidFill>
+                <a:latin typeface="Courier"/>
+              </a:rPr>
+              <a:t>theta </a:t>
+            </a:r>
+            <a:r>
+              <a:rPr>
+                <a:solidFill>
+                  <a:srgbClr val="5E5E5E"/>
+                </a:solidFill>
+                <a:latin typeface="Courier"/>
+              </a:rPr>
+              <a:t>=</a:t>
+            </a:r>
+            <a:r>
+              <a:rPr>
+                <a:solidFill>
+                  <a:srgbClr val="003B4F"/>
+                </a:solidFill>
+                <a:latin typeface="Courier"/>
+              </a:rPr>
+              <a:t> </a:t>
+            </a:r>
+            <a:r>
+              <a:rPr>
+                <a:solidFill>
+                  <a:srgbClr val="AD0000"/>
+                </a:solidFill>
+                <a:latin typeface="Courier"/>
+              </a:rPr>
+              <a:t>2</a:t>
+            </a:r>
+            <a:r>
+              <a:rPr>
+                <a:solidFill>
+                  <a:srgbClr val="003B4F"/>
+                </a:solidFill>
+                <a:latin typeface="Courier"/>
+              </a:rPr>
+              <a:t> </a:t>
+            </a:r>
+            <a:r>
+              <a:rPr>
+                <a:solidFill>
+                  <a:srgbClr val="5E5E5E"/>
+                </a:solidFill>
+                <a:latin typeface="Courier"/>
+              </a:rPr>
+              <a:t>*</a:t>
+            </a:r>
+            <a:r>
+              <a:rPr>
+                <a:solidFill>
+                  <a:srgbClr val="003B4F"/>
+                </a:solidFill>
+                <a:latin typeface="Courier"/>
+              </a:rPr>
+              <a:t> np.pi </a:t>
+            </a:r>
+            <a:r>
+              <a:rPr>
+                <a:solidFill>
+                  <a:srgbClr val="5E5E5E"/>
+                </a:solidFill>
+                <a:latin typeface="Courier"/>
+              </a:rPr>
+              <a:t>*</a:t>
+            </a:r>
+            <a:r>
+              <a:rPr>
+                <a:solidFill>
+                  <a:srgbClr val="003B4F"/>
+                </a:solidFill>
+                <a:latin typeface="Courier"/>
+              </a:rPr>
+              <a:t> r</a:t>
+            </a:r>
+            <a:br/>
+            <a:r>
+              <a:rPr>
+                <a:solidFill>
+                  <a:srgbClr val="003B4F"/>
+                </a:solidFill>
+                <a:latin typeface="Courier"/>
+              </a:rPr>
+              <a:t>fig, ax </a:t>
+            </a:r>
+            <a:r>
+              <a:rPr>
+                <a:solidFill>
+                  <a:srgbClr val="5E5E5E"/>
+                </a:solidFill>
+                <a:latin typeface="Courier"/>
+              </a:rPr>
+              <a:t>=</a:t>
+            </a:r>
+            <a:r>
+              <a:rPr>
+                <a:solidFill>
+                  <a:srgbClr val="003B4F"/>
+                </a:solidFill>
+                <a:latin typeface="Courier"/>
+              </a:rPr>
+              <a:t> plt.subplots(subplot_kw</a:t>
+            </a:r>
+            <a:r>
+              <a:rPr>
+                <a:solidFill>
+                  <a:srgbClr val="5E5E5E"/>
+                </a:solidFill>
+                <a:latin typeface="Courier"/>
+              </a:rPr>
+              <a:t>=</a:t>
+            </a:r>
+            <a:r>
+              <a:rPr>
+                <a:solidFill>
+                  <a:srgbClr val="003B4F"/>
+                </a:solidFill>
+                <a:latin typeface="Courier"/>
+              </a:rPr>
+              <a:t>{</a:t>
+            </a:r>
+            <a:r>
+              <a:rPr>
+                <a:solidFill>
+                  <a:srgbClr val="20794D"/>
+                </a:solidFill>
+                <a:latin typeface="Courier"/>
+              </a:rPr>
+              <a:t>'projection'</a:t>
+            </a:r>
+            <a:r>
+              <a:rPr>
+                <a:solidFill>
+                  <a:srgbClr val="003B4F"/>
+                </a:solidFill>
+                <a:latin typeface="Courier"/>
+              </a:rPr>
+              <a:t>: </a:t>
+            </a:r>
+            <a:r>
+              <a:rPr>
+                <a:solidFill>
+                  <a:srgbClr val="20794D"/>
+                </a:solidFill>
+                <a:latin typeface="Courier"/>
+              </a:rPr>
+              <a:t>'polar'</a:t>
+            </a:r>
+            <a:r>
+              <a:rPr>
+                <a:solidFill>
+                  <a:srgbClr val="003B4F"/>
+                </a:solidFill>
+                <a:latin typeface="Courier"/>
+              </a:rPr>
+              <a:t>})</a:t>
+            </a:r>
+            <a:br/>
+            <a:r>
+              <a:rPr>
+                <a:solidFill>
+                  <a:srgbClr val="003B4F"/>
+                </a:solidFill>
+                <a:latin typeface="Courier"/>
+              </a:rPr>
+              <a:t>ax.plot(theta, r)</a:t>
+            </a:r>
+            <a:br/>
+            <a:r>
+              <a:rPr>
+                <a:solidFill>
+                  <a:srgbClr val="003B4F"/>
+                </a:solidFill>
+                <a:latin typeface="Courier"/>
+              </a:rPr>
+              <a:t>ax.set_rticks([</a:t>
+            </a:r>
+            <a:r>
+              <a:rPr>
+                <a:solidFill>
+                  <a:srgbClr val="AD0000"/>
+                </a:solidFill>
+                <a:latin typeface="Courier"/>
+              </a:rPr>
+              <a:t>0.5</a:t>
+            </a:r>
+            <a:r>
+              <a:rPr>
+                <a:solidFill>
+                  <a:srgbClr val="003B4F"/>
+                </a:solidFill>
+                <a:latin typeface="Courier"/>
+              </a:rPr>
+              <a:t>, </a:t>
+            </a:r>
+            <a:r>
+              <a:rPr>
+                <a:solidFill>
+                  <a:srgbClr val="AD0000"/>
+                </a:solidFill>
+                <a:latin typeface="Courier"/>
+              </a:rPr>
+              <a:t>1</a:t>
+            </a:r>
+            <a:r>
+              <a:rPr>
+                <a:solidFill>
+                  <a:srgbClr val="003B4F"/>
+                </a:solidFill>
+                <a:latin typeface="Courier"/>
+              </a:rPr>
+              <a:t>, </a:t>
+            </a:r>
+            <a:r>
+              <a:rPr>
+                <a:solidFill>
+                  <a:srgbClr val="AD0000"/>
+                </a:solidFill>
+                <a:latin typeface="Courier"/>
+              </a:rPr>
+              <a:t>1.5</a:t>
+            </a:r>
+            <a:r>
+              <a:rPr>
+                <a:solidFill>
+                  <a:srgbClr val="003B4F"/>
+                </a:solidFill>
+                <a:latin typeface="Courier"/>
+              </a:rPr>
+              <a:t>, </a:t>
+            </a:r>
+            <a:r>
+              <a:rPr>
+                <a:solidFill>
+                  <a:srgbClr val="AD0000"/>
+                </a:solidFill>
+                <a:latin typeface="Courier"/>
+              </a:rPr>
+              <a:t>2</a:t>
+            </a:r>
+            <a:r>
+              <a:rPr>
+                <a:solidFill>
+                  <a:srgbClr val="003B4F"/>
+                </a:solidFill>
+                <a:latin typeface="Courier"/>
+              </a:rPr>
+              <a:t>])</a:t>
+            </a:r>
+            <a:br/>
+            <a:r>
+              <a:rPr>
+                <a:solidFill>
+                  <a:srgbClr val="003B4F"/>
+                </a:solidFill>
+                <a:latin typeface="Courier"/>
+              </a:rPr>
+              <a:t>ax.grid(</a:t>
+            </a:r>
+            <a:r>
+              <a:rPr>
+                <a:solidFill>
+                  <a:srgbClr val="111111"/>
+                </a:solidFill>
+                <a:latin typeface="Courier"/>
+              </a:rPr>
+              <a:t>True</a:t>
+            </a:r>
+            <a:r>
+              <a:rPr>
+                <a:solidFill>
+                  <a:srgbClr val="003B4F"/>
+                </a:solidFill>
+                <a:latin typeface="Courier"/>
+              </a:rPr>
+              <a:t>)</a:t>
+            </a:r>
+            <a:br/>
+            <a:r>
+              <a:rPr>
+                <a:solidFill>
+                  <a:srgbClr val="003B4F"/>
+                </a:solidFill>
+                <a:latin typeface="Courier"/>
+              </a:rPr>
+              <a:t>plt.show()</a:t>
+            </a:r>
+          </a:p>
+        </p:txBody>
+      </p:sp>
+      <p:pic>
+        <p:nvPicPr>
+          <p:cNvPr descr="using-quarto-ppt_files/figure-pptx/cell-2-output-1.png" id="0" name="Picture 1"/>
+          <p:cNvPicPr>
+            <a:picLocks noGrp="1" noChangeAspect="1"/>
+          </p:cNvPicPr>
+          <p:nvPr/>
+        </p:nvPicPr>
+        <p:blipFill>
+          <a:blip r:embed="rId2"/>
+          <a:stretch>
+            <a:fillRect/>
+          </a:stretch>
+        </p:blipFill>
+        <p:spPr bwMode="auto">
+          <a:xfrm>
+            <a:off x="3035300" y="1689100"/>
+            <a:ext cx="3073400" cy="2984500"/>
+          </a:xfrm>
+          <a:prstGeom prst="rect">
+            <a:avLst/>
+          </a:prstGeom>
+          <a:noFill/>
+          <a:ln w="9525">
+            <a:noFill/>
+            <a:headEnd/>
+            <a:tailEnd/>
+          </a:ln>
+        </p:spPr>
+      </p:pic>
     </p:spTree>
   </p:cSld>
 </p:sld>
@@ -4722,7 +4890,12 @@
             <p:ph type="title"/>
           </p:nvPr>
         </p:nvSpPr>
-        <p:spPr/>
+        <p:spPr>
+          <a:xfrm>
+            <a:off x="722313" y="3305176"/>
+            <a:ext cx="7772400" cy="1021556"/>
+          </a:xfrm>
+        </p:spPr>
         <p:txBody>
           <a:bodyPr/>
           <a:lstStyle/>
@@ -4732,72 +4905,7 @@
             </a:pPr>
             <a:r>
               <a:rPr/>
-              <a:t>Things that you can add to a template</a:t>
-            </a:r>
-          </a:p>
-        </p:txBody>
-      </p:sp>
-      <p:sp>
-        <p:nvSpPr>
-          <p:cNvPr id="3" name="Content Placeholder 2"/>
-          <p:cNvSpPr>
-            <a:spLocks noGrp="1"/>
-          </p:cNvSpPr>
-          <p:nvPr>
-            <p:ph idx="1"/>
-          </p:nvPr>
-        </p:nvSpPr>
-        <p:spPr/>
-        <p:txBody>
-          <a:bodyPr/>
-          <a:lstStyle/>
-          <a:p>
-            <a:pPr lvl="0"/>
-            <a:r>
-              <a:rPr/>
-              <a:t>Title Slide</a:t>
-            </a:r>
-          </a:p>
-          <a:p>
-            <a:pPr lvl="0"/>
-            <a:r>
-              <a:rPr/>
-              <a:t>Title and Content</a:t>
-            </a:r>
-          </a:p>
-          <a:p>
-            <a:pPr lvl="0"/>
-            <a:r>
-              <a:rPr/>
-              <a:t>Section Header</a:t>
-            </a:r>
-          </a:p>
-          <a:p>
-            <a:pPr lvl="0"/>
-            <a:r>
-              <a:rPr/>
-              <a:t>Two Content</a:t>
-            </a:r>
-          </a:p>
-          <a:p>
-            <a:pPr lvl="0"/>
-            <a:r>
-              <a:rPr/>
-              <a:t>Comparison</a:t>
-            </a:r>
-          </a:p>
-          <a:p>
-            <a:pPr lvl="0"/>
-            <a:r>
-              <a:rPr/>
-              <a:t>Content with Caption</a:t>
-            </a:r>
-          </a:p>
-          <a:p>
-            <a:pPr lvl="0"/>
-            <a:r>
-              <a:rPr/>
-              <a:t>Blank</a:t>
+              <a:t>Presentations</a:t>
             </a:r>
           </a:p>
         </p:txBody>
@@ -4844,7 +4952,7 @@
             </a:pPr>
             <a:r>
               <a:rPr/>
-              <a:t>Projects</a:t>
+              <a:t>Things that you can add to a template</a:t>
             </a:r>
           </a:p>
         </p:txBody>
@@ -4864,12 +4972,52 @@
           <a:bodyPr/>
           <a:lstStyle/>
           <a:p>
-            <a:pPr lvl="0" indent="0" marL="0">
-              <a:buNone/>
-            </a:pPr>
-            <a:r>
-              <a:rPr/>
-              <a:t>You can use Quarto to generate the whole shebang!</a:t>
+            <a:pPr lvl="0"/>
+            <a:r>
+              <a:rPr/>
+              <a:t>Title Slide</a:t>
+            </a:r>
+          </a:p>
+          <a:p>
+            <a:pPr lvl="0"/>
+            <a:r>
+              <a:rPr/>
+              <a:t>Title and Content</a:t>
+            </a:r>
+          </a:p>
+          <a:p>
+            <a:pPr lvl="0"/>
+            <a:r>
+              <a:rPr/>
+              <a:t>Section Header</a:t>
+            </a:r>
+          </a:p>
+          <a:p>
+            <a:pPr lvl="0"/>
+            <a:r>
+              <a:rPr/>
+              <a:t>Two Content</a:t>
+            </a:r>
+          </a:p>
+          <a:p>
+            <a:pPr lvl="0"/>
+            <a:r>
+              <a:rPr/>
+              <a:t>Comparison</a:t>
+            </a:r>
+          </a:p>
+          <a:p>
+            <a:pPr lvl="0"/>
+            <a:r>
+              <a:rPr/>
+              <a:t>Content with Caption</a:t>
+            </a:r>
+          </a:p>
+          <a:p>
+            <a:pPr lvl="0"/>
+            <a:r>
+              <a:rPr/>
+              <a:t>Blank</a:t>
             </a:r>
           </a:p>
         </p:txBody>
@@ -4906,12 +5054,7 @@
             <p:ph type="title"/>
           </p:nvPr>
         </p:nvSpPr>
-        <p:spPr>
-          <a:xfrm>
-            <a:off x="722313" y="3305176"/>
-            <a:ext cx="7772400" cy="1021556"/>
-          </a:xfrm>
-        </p:spPr>
+        <p:spPr/>
         <p:txBody>
           <a:bodyPr/>
           <a:lstStyle/>
@@ -4921,7 +5064,7 @@
             </a:pPr>
             <a:r>
               <a:rPr/>
-              <a:t>Appendix</a:t>
+              <a:t>Dependency ratios around the world</a:t>
             </a:r>
           </a:p>
         </p:txBody>
@@ -4950,6 +5093,177 @@
       </p:grpSpPr>
       <p:sp>
         <p:nvSpPr>
+          <p:cNvPr id="2" name="Title 1"/>
+          <p:cNvSpPr>
+            <a:spLocks noGrp="1"/>
+          </p:cNvSpPr>
+          <p:nvPr>
+            <p:ph type="title"/>
+          </p:nvPr>
+        </p:nvSpPr>
+        <p:spPr/>
+        <p:txBody>
+          <a:bodyPr/>
+          <a:lstStyle/>
+          <a:p>
+            <a:pPr lvl="0" indent="0" marL="0">
+              <a:buNone/>
+            </a:pPr>
+            <a:r>
+              <a:rPr/>
+              <a:t>Population pyramids around the world</a:t>
+            </a:r>
+          </a:p>
+        </p:txBody>
+      </p:sp>
+    </p:spTree>
+  </p:cSld>
+</p:sld>
+</file>
+
+<file path=ppt/slides/slide16.xml><?xml version="1.0" encoding="utf-8"?>
+<p:sld xmlns:a="http://schemas.openxmlformats.org/drawingml/2006/main" xmlns:r="http://schemas.openxmlformats.org/officeDocument/2006/relationships" xmlns:p="http://schemas.openxmlformats.org/presentationml/2006/main">
+  <p:cSld>
+    <p:spTree>
+      <p:nvGrpSpPr>
+        <p:cNvPr id="1" name=""/>
+        <p:cNvGrpSpPr/>
+        <p:nvPr/>
+      </p:nvGrpSpPr>
+      <p:grpSpPr>
+        <a:xfrm>
+          <a:off x="0" y="0"/>
+          <a:ext cx="0" cy="0"/>
+          <a:chOff x="0" y="0"/>
+          <a:chExt cx="0" cy="0"/>
+        </a:xfrm>
+      </p:grpSpPr>
+      <p:sp>
+        <p:nvSpPr>
+          <p:cNvPr id="2" name="Title 1"/>
+          <p:cNvSpPr>
+            <a:spLocks noGrp="1"/>
+          </p:cNvSpPr>
+          <p:nvPr>
+            <p:ph type="title"/>
+          </p:nvPr>
+        </p:nvSpPr>
+        <p:spPr/>
+        <p:txBody>
+          <a:bodyPr/>
+          <a:lstStyle/>
+          <a:p>
+            <a:pPr lvl="0" indent="0" marL="0">
+              <a:buNone/>
+            </a:pPr>
+            <a:r>
+              <a:rPr/>
+              <a:t>Projects</a:t>
+            </a:r>
+          </a:p>
+        </p:txBody>
+      </p:sp>
+      <p:sp>
+        <p:nvSpPr>
+          <p:cNvPr id="3" name="Content Placeholder 2"/>
+          <p:cNvSpPr>
+            <a:spLocks noGrp="1"/>
+          </p:cNvSpPr>
+          <p:nvPr>
+            <p:ph idx="1"/>
+          </p:nvPr>
+        </p:nvSpPr>
+        <p:spPr/>
+        <p:txBody>
+          <a:bodyPr/>
+          <a:lstStyle/>
+          <a:p>
+            <a:pPr lvl="0" indent="0" marL="0">
+              <a:buNone/>
+            </a:pPr>
+            <a:r>
+              <a:rPr/>
+              <a:t>You can use Quarto to generate the whole shebang!</a:t>
+            </a:r>
+          </a:p>
+        </p:txBody>
+      </p:sp>
+    </p:spTree>
+  </p:cSld>
+</p:sld>
+</file>
+
+<file path=ppt/slides/slide17.xml><?xml version="1.0" encoding="utf-8"?>
+<p:sld xmlns:a="http://schemas.openxmlformats.org/drawingml/2006/main" xmlns:r="http://schemas.openxmlformats.org/officeDocument/2006/relationships" xmlns:p="http://schemas.openxmlformats.org/presentationml/2006/main">
+  <p:cSld>
+    <p:spTree>
+      <p:nvGrpSpPr>
+        <p:cNvPr id="1" name=""/>
+        <p:cNvGrpSpPr/>
+        <p:nvPr/>
+      </p:nvGrpSpPr>
+      <p:grpSpPr>
+        <a:xfrm>
+          <a:off x="0" y="0"/>
+          <a:ext cx="0" cy="0"/>
+          <a:chOff x="0" y="0"/>
+          <a:chExt cx="0" cy="0"/>
+        </a:xfrm>
+      </p:grpSpPr>
+      <p:sp>
+        <p:nvSpPr>
+          <p:cNvPr id="2" name="Title 1"/>
+          <p:cNvSpPr>
+            <a:spLocks noGrp="1"/>
+          </p:cNvSpPr>
+          <p:nvPr>
+            <p:ph type="title"/>
+          </p:nvPr>
+        </p:nvSpPr>
+        <p:spPr>
+          <a:xfrm>
+            <a:off x="722313" y="3305176"/>
+            <a:ext cx="7772400" cy="1021556"/>
+          </a:xfrm>
+        </p:spPr>
+        <p:txBody>
+          <a:bodyPr/>
+          <a:lstStyle/>
+          <a:p>
+            <a:pPr lvl="0" indent="0" marL="0">
+              <a:buNone/>
+            </a:pPr>
+            <a:r>
+              <a:rPr/>
+              <a:t>Appendix</a:t>
+            </a:r>
+          </a:p>
+        </p:txBody>
+      </p:sp>
+    </p:spTree>
+  </p:cSld>
+</p:sld>
+</file>
+
+<file path=ppt/slides/slide18.xml><?xml version="1.0" encoding="utf-8"?>
+<p:sld xmlns:a="http://schemas.openxmlformats.org/drawingml/2006/main" xmlns:r="http://schemas.openxmlformats.org/officeDocument/2006/relationships" xmlns:p="http://schemas.openxmlformats.org/presentationml/2006/main">
+  <p:cSld>
+    <p:spTree>
+      <p:nvGrpSpPr>
+        <p:cNvPr id="1" name=""/>
+        <p:cNvGrpSpPr/>
+        <p:nvPr/>
+      </p:nvGrpSpPr>
+      <p:grpSpPr>
+        <a:xfrm>
+          <a:off x="0" y="0"/>
+          <a:ext cx="0" cy="0"/>
+          <a:chOff x="0" y="0"/>
+          <a:chExt cx="0" cy="0"/>
+        </a:xfrm>
+      </p:grpSpPr>
+      <p:sp>
+        <p:nvSpPr>
           <p:cNvPr id="9" name="Title 1">
             <a:extLst>
               <a:ext uri="{FF2B5EF4-FFF2-40B4-BE49-F238E27FC236}">
@@ -5011,7 +5325,7 @@
       </p:sp>
       <p:pic>
         <p:nvPicPr>
-          <p:cNvPr descr="using-quarto-ppt_files/figure-pptx/cell-3-output-1.png" id="0" name="Picture 1"/>
+          <p:cNvPr descr="using-quarto-ppt_files/figure-pptx/cell-5-output-1.png" id="0" name="Picture 1"/>
           <p:cNvPicPr>
             <a:picLocks noGrp="1" noChangeAspect="1"/>
           </p:cNvPicPr>
@@ -5025,8 +5339,8 @@
         </p:blipFill>
         <p:spPr bwMode="auto">
           <a:xfrm>
-            <a:off x="1790700" y="1689100"/>
-            <a:ext cx="5549900" cy="2984500"/>
+            <a:off x="2387600" y="1689100"/>
+            <a:ext cx="4381500" cy="2984500"/>
           </a:xfrm>
           <a:prstGeom prst="rect">
             <a:avLst/>
@@ -5039,6 +5353,74 @@
           </a:ln>
         </p:spPr>
       </p:pic>
+    </p:spTree>
+  </p:cSld>
+</p:sld>
+</file>
+
+<file path=ppt/slides/slide19.xml><?xml version="1.0" encoding="utf-8"?>
+<p:sld xmlns:a="http://schemas.openxmlformats.org/drawingml/2006/main" xmlns:r="http://schemas.openxmlformats.org/officeDocument/2006/relationships" xmlns:p="http://schemas.openxmlformats.org/presentationml/2006/main">
+  <p:cSld>
+    <p:spTree>
+      <p:nvGrpSpPr>
+        <p:cNvPr id="1" name=""/>
+        <p:cNvGrpSpPr/>
+        <p:nvPr/>
+      </p:nvGrpSpPr>
+      <p:grpSpPr>
+        <a:xfrm>
+          <a:off x="0" y="0"/>
+          <a:ext cx="0" cy="0"/>
+          <a:chOff x="0" y="0"/>
+          <a:chExt cx="0" cy="0"/>
+        </a:xfrm>
+      </p:grpSpPr>
+      <p:sp>
+        <p:nvSpPr>
+          <p:cNvPr id="2" name="Title 1"/>
+          <p:cNvSpPr>
+            <a:spLocks noGrp="1"/>
+          </p:cNvSpPr>
+          <p:nvPr>
+            <p:ph type="title"/>
+          </p:nvPr>
+        </p:nvSpPr>
+        <p:spPr/>
+        <p:txBody>
+          <a:bodyPr/>
+          <a:lstStyle/>
+          <a:p>
+            <a:pPr lvl="0" indent="0" marL="0">
+              <a:buNone/>
+            </a:pPr>
+            <a:r>
+              <a:rPr/>
+              <a:t>Mermaid Diagram 1</a:t>
+            </a:r>
+          </a:p>
+        </p:txBody>
+      </p:sp>
+      <p:sp>
+        <p:nvSpPr>
+          <p:cNvPr id="3" name="Content Placeholder 2"/>
+          <p:cNvSpPr>
+            <a:spLocks noGrp="1"/>
+          </p:cNvSpPr>
+          <p:nvPr>
+            <p:ph idx="1"/>
+          </p:nvPr>
+        </p:nvSpPr>
+        <p:spPr/>
+        <p:txBody>
+          <a:bodyPr/>
+          <a:lstStyle/>
+          <a:p>
+            <a:pPr lvl="0" indent="0" marL="0">
+              <a:buNone/>
+            </a:pPr>
+          </a:p>
+        </p:txBody>
+      </p:sp>
     </p:spTree>
   </p:cSld>
 </p:sld>
@@ -5088,6 +5470,91 @@
               <a:rPr/>
               <a:t>Why Quarto</a:t>
             </a:r>
+          </a:p>
+        </p:txBody>
+      </p:sp>
+    </p:spTree>
+  </p:cSld>
+</p:sld>
+</file>
+
+<file path=ppt/slides/slide20.xml><?xml version="1.0" encoding="utf-8"?>
+<p:sld xmlns:a="http://schemas.openxmlformats.org/drawingml/2006/main" xmlns:r="http://schemas.openxmlformats.org/officeDocument/2006/relationships" xmlns:p="http://schemas.openxmlformats.org/presentationml/2006/main">
+  <p:cSld>
+    <p:spTree>
+      <p:nvGrpSpPr>
+        <p:cNvPr id="1" name=""/>
+        <p:cNvGrpSpPr/>
+        <p:nvPr/>
+      </p:nvGrpSpPr>
+      <p:grpSpPr>
+        <a:xfrm>
+          <a:off x="0" y="0"/>
+          <a:ext cx="0" cy="0"/>
+          <a:chOff x="0" y="0"/>
+          <a:chExt cx="0" cy="0"/>
+        </a:xfrm>
+      </p:grpSpPr>
+      <p:sp>
+        <p:nvSpPr>
+          <p:cNvPr id="2" name="Title 1"/>
+          <p:cNvSpPr>
+            <a:spLocks noGrp="1"/>
+          </p:cNvSpPr>
+          <p:nvPr>
+            <p:ph type="title"/>
+          </p:nvPr>
+        </p:nvSpPr>
+        <p:spPr/>
+        <p:txBody>
+          <a:bodyPr/>
+          <a:lstStyle/>
+          <a:p>
+            <a:pPr lvl="0" indent="0" marL="0">
+              <a:buNone/>
+            </a:pPr>
+            <a:r>
+              <a:rPr/>
+              <a:t>Mermaid Diagram 2</a:t>
+            </a:r>
+          </a:p>
+        </p:txBody>
+      </p:sp>
+      <p:sp>
+        <p:nvSpPr>
+          <p:cNvPr id="3" name="Content Placeholder 2"/>
+          <p:cNvSpPr>
+            <a:spLocks noGrp="1"/>
+          </p:cNvSpPr>
+          <p:nvPr>
+            <p:ph idx="1"/>
+          </p:nvPr>
+        </p:nvSpPr>
+        <p:spPr/>
+        <p:txBody>
+          <a:bodyPr/>
+          <a:lstStyle/>
+          <a:p>
+            <a:pPr lvl="0" indent="0" marL="0">
+              <a:buNone/>
+            </a:pPr>
+          </a:p>
+          <a:p>
+            <a:pPr lvl="0" indent="0" marL="0">
+              <a:spcBef>
+                <a:spcPts val="3000"/>
+              </a:spcBef>
+              <a:buNone/>
+            </a:pPr>
+            <a:r>
+              <a:rPr b="1"/>
+              <a:t>Mermaid Diagram 3</a:t>
+            </a:r>
+          </a:p>
+          <a:p>
+            <a:pPr lvl="0" indent="0" marL="0">
+              <a:buNone/>
+            </a:pPr>
           </a:p>
         </p:txBody>
       </p:sp>
@@ -5216,11 +5683,11 @@
             <a:pPr lvl="0"/>
             <a:r>
               <a:rPr/>
-              <a:t>Gets things out of my computer </a:t>
+              <a:t>Move content out of my computer </a:t>
             </a:r>
             <a:r>
               <a:rPr b="1"/>
-              <a:t>fast</a:t>
+              <a:t>as fast as possible</a:t>
             </a:r>
           </a:p>
           <a:p>
@@ -5820,7 +6287,7 @@
             </a:pPr>
             <a:r>
               <a:rPr b="1"/>
-              <a:t>Challenges</a:t>
+              <a:t>Population project challenges</a:t>
             </a:r>
           </a:p>
           <a:p>
@@ -6139,7 +6606,13 @@
       </p:grpSpPr>
       <p:sp>
         <p:nvSpPr>
-          <p:cNvPr id="2" name="Title 1"/>
+          <p:cNvPr id="9" name="Title 1">
+            <a:extLst>
+              <a:ext uri="{FF2B5EF4-FFF2-40B4-BE49-F238E27FC236}">
+                <a16:creationId xmlns:a16="http://schemas.microsoft.com/office/drawing/2014/main" id="{039B6DB2-D068-C680-F293-31EEF2D13404}"/>
+              </a:ext>
+            </a:extLst>
+          </p:cNvPr>
           <p:cNvSpPr>
             <a:spLocks noGrp="1"/>
           </p:cNvSpPr>
@@ -6147,6 +6620,36 @@
             <p:ph type="title"/>
           </p:nvPr>
         </p:nvSpPr>
+        <p:spPr>
+          <a:xfrm>
+            <a:off x="457200" y="205979"/>
+            <a:ext cx="8229600" cy="857250"/>
+          </a:xfrm>
+        </p:spPr>
+        <p:txBody>
+          <a:bodyPr/>
+          <a:lstStyle/>
+          <a:p>
+            <a:pPr lvl="0" indent="0" marL="0">
+              <a:buNone/>
+            </a:pPr>
+            <a:r>
+              <a:rPr/>
+              <a:t>The content pipeline for .ipynb</a:t>
+            </a:r>
+          </a:p>
+        </p:txBody>
+      </p:sp>
+      <p:sp>
+        <p:nvSpPr>
+          <p:cNvPr id="4" name="Text Placeholder 3"/>
+          <p:cNvSpPr>
+            <a:spLocks noGrp="1"/>
+          </p:cNvSpPr>
+          <p:nvPr>
+            <p:ph idx="2" sz="half" type="body"/>
+          </p:nvPr>
+        </p:nvSpPr>
         <p:spPr/>
         <p:txBody>
           <a:bodyPr/>
@@ -6157,42 +6660,88 @@
             </a:pPr>
             <a:r>
               <a:rPr/>
-              <a:t>Quarto</a:t>
-            </a:r>
-          </a:p>
-        </p:txBody>
-      </p:sp>
-      <p:sp>
-        <p:nvSpPr>
-          <p:cNvPr id="3" name="Content Placeholder 2"/>
-          <p:cNvSpPr>
-            <a:spLocks noGrp="1"/>
-          </p:cNvSpPr>
-          <p:nvPr>
-            <p:ph idx="1"/>
-          </p:nvPr>
-        </p:nvSpPr>
-        <p:spPr/>
-        <p:txBody>
-          <a:bodyPr/>
-          <a:lstStyle/>
-          <a:p>
-            <a:pPr lvl="0" indent="0" marL="0">
-              <a:buNone/>
-            </a:pPr>
-            <a:r>
-              <a:rPr/>
-              <a:t>Quarto is </a:t>
+              <a:t>About </a:t>
             </a:r>
             <a:r>
               <a:rPr>
+                <a:hlinkClick r:id="rId2"/>
+              </a:rPr>
+              <a:t>75% of data scientists</a:t>
+            </a:r>
+            <a:r>
+              <a:rPr/>
+              <a:t> use Python through Jupyter notebooks, and one can use </a:t>
+            </a:r>
+            <a:r>
+              <a:rPr>
+                <a:hlinkClick r:id="rId3"/>
                 <a:latin typeface="Courier"/>
               </a:rPr>
               <a:t>pandoc</a:t>
             </a:r>
             <a:r>
               <a:rPr/>
-              <a:t> on steroids, and solves a lot of problems.</a:t>
+              <a:t> to generate papers and PowerPoint, but it can be complicated.</a:t>
+            </a:r>
+          </a:p>
+        </p:txBody>
+      </p:sp>
+      <p:pic>
+        <p:nvPicPr>
+          <p:cNvPr descr="fig:  images/mermaid1.png" id="0" name="Picture 1"/>
+          <p:cNvPicPr>
+            <a:picLocks noGrp="1" noChangeAspect="1"/>
+          </p:cNvPicPr>
+          <p:nvPr/>
+        </p:nvPicPr>
+        <p:blipFill>
+          <a:blip r:embed="rId4"/>
+          <a:stretch>
+            <a:fillRect/>
+          </a:stretch>
+        </p:blipFill>
+        <p:spPr bwMode="auto">
+          <a:xfrm>
+            <a:off x="2667000" y="1689100"/>
+            <a:ext cx="3810000" cy="2476500"/>
+          </a:xfrm>
+          <a:prstGeom prst="rect">
+            <a:avLst/>
+          </a:prstGeom>
+          <a:noFill/>
+          <a:ln w="9525">
+            <a:noFill/>
+            <a:headEnd/>
+            <a:tailEnd/>
+          </a:ln>
+        </p:spPr>
+      </p:pic>
+      <p:sp>
+        <p:nvSpPr>
+          <p:cNvPr id="1" name="TextBox 3"/>
+          <p:cNvSpPr txBox="1"/>
+          <p:nvPr/>
+        </p:nvSpPr>
+        <p:spPr>
+          <a:xfrm>
+            <a:off x="457200" y="4165600"/>
+            <a:ext cx="8229600" cy="508000"/>
+          </a:xfrm>
+          <a:prstGeom prst="rect">
+            <a:avLst/>
+          </a:prstGeom>
+          <a:noFill/>
+        </p:spPr>
+        <p:txBody>
+          <a:bodyPr/>
+          <a:lstStyle/>
+          <a:p>
+            <a:pPr lvl="0" indent="0" marL="0" algn="ctr">
+              <a:buNone/>
+            </a:pPr>
+            <a:r>
+              <a:rPr/>
+              <a:t>Processing ipynb</a:t>
             </a:r>
           </a:p>
         </p:txBody>
@@ -6221,12 +6770,48 @@
       </p:grpSpPr>
       <p:sp>
         <p:nvSpPr>
-          <p:cNvPr id="3" name="Content Placeholder 2"/>
-          <p:cNvSpPr>
-            <a:spLocks noGrp="1"/>
-          </p:cNvSpPr>
-          <p:nvPr>
-            <p:ph idx="1" sz="half"/>
+          <p:cNvPr id="9" name="Title 1">
+            <a:extLst>
+              <a:ext uri="{FF2B5EF4-FFF2-40B4-BE49-F238E27FC236}">
+                <a16:creationId xmlns:a16="http://schemas.microsoft.com/office/drawing/2014/main" id="{039B6DB2-D068-C680-F293-31EEF2D13404}"/>
+              </a:ext>
+            </a:extLst>
+          </p:cNvPr>
+          <p:cNvSpPr>
+            <a:spLocks noGrp="1"/>
+          </p:cNvSpPr>
+          <p:nvPr>
+            <p:ph type="title"/>
+          </p:nvPr>
+        </p:nvSpPr>
+        <p:spPr>
+          <a:xfrm>
+            <a:off x="457200" y="205979"/>
+            <a:ext cx="8229600" cy="857250"/>
+          </a:xfrm>
+        </p:spPr>
+        <p:txBody>
+          <a:bodyPr/>
+          <a:lstStyle/>
+          <a:p>
+            <a:pPr lvl="0" indent="0" marL="0">
+              <a:buNone/>
+            </a:pPr>
+            <a:r>
+              <a:rPr/>
+              <a:t>Quarto for Python, in a nutshell</a:t>
+            </a:r>
+          </a:p>
+        </p:txBody>
+      </p:sp>
+      <p:sp>
+        <p:nvSpPr>
+          <p:cNvPr id="4" name="Text Placeholder 3"/>
+          <p:cNvSpPr>
+            <a:spLocks noGrp="1"/>
+          </p:cNvSpPr>
+          <p:nvPr>
+            <p:ph idx="2" sz="half" type="body"/>
           </p:nvPr>
         </p:nvSpPr>
         <p:spPr/>
@@ -6235,187 +6820,101 @@
           <a:lstStyle/>
           <a:p>
             <a:pPr lvl="0" indent="0" marL="0">
-              <a:spcBef>
-                <a:spcPts val="3000"/>
-              </a:spcBef>
               <a:buNone/>
             </a:pPr>
             <a:r>
-              <a:rPr b="1"/>
-              <a:t>LaTeX</a:t>
-            </a:r>
-          </a:p>
-          <a:p>
-            <a:pPr lvl="0"/>
-            <a:r>
-              <a:rPr/>
-              <a:t>Great for PDFs… Ok, Beamer!</a:t>
-            </a:r>
-          </a:p>
-          <a:p>
-            <a:pPr lvl="0"/>
-            <a:r>
-              <a:rPr/>
-              <a:t>Website generation is not great</a:t>
-            </a:r>
-          </a:p>
-          <a:p>
-            <a:pPr lvl="0"/>
-            <a:r>
-              <a:rPr/>
-              <a:t>I even know how to write code!</a:t>
-            </a:r>
-          </a:p>
-          <a:p>
-            <a:pPr lvl="1"/>
+              <a:rPr/>
+              <a:t>In Quarto’s </a:t>
+            </a:r>
             <a:r>
               <a:rPr>
                 <a:latin typeface="Courier"/>
               </a:rPr>
-              <a:t>\usepackage{ifthen}</a:t>
-            </a:r>
-          </a:p>
-          <a:p>
-            <a:pPr lvl="1"/>
+              <a:t>.qmd</a:t>
+            </a:r>
+            <a:r>
+              <a:rPr/>
+              <a:t> files, you write Markdown and code, just like </a:t>
+            </a:r>
             <a:r>
               <a:rPr>
                 <a:latin typeface="Courier"/>
               </a:rPr>
-              <a:t>@for</a:t>
-            </a:r>
-            <a:r>
-              <a:rPr/>
-              <a:t>, </a:t>
+              <a:t>.ipynb</a:t>
+            </a:r>
+            <a:r>
+              <a:rPr/>
+              <a:t>. Add some </a:t>
             </a:r>
             <a:r>
               <a:rPr>
                 <a:latin typeface="Courier"/>
               </a:rPr>
-              <a:t>@while</a:t>
-            </a:r>
-          </a:p>
-          <a:p>
-            <a:pPr lvl="0" indent="0" marL="0">
-              <a:spcBef>
-                <a:spcPts val="3000"/>
-              </a:spcBef>
+              <a:t>YAML</a:t>
+            </a:r>
+            <a:r>
+              <a:rPr/>
+              <a:t> configuration and Quarto does the intermediate steps. It integrates well with VSCode and Jupyter.</a:t>
+            </a:r>
+          </a:p>
+        </p:txBody>
+      </p:sp>
+      <p:pic>
+        <p:nvPicPr>
+          <p:cNvPr descr="fig:  images/mermaid2-quarto-nutshell.png" id="0" name="Picture 1"/>
+          <p:cNvPicPr>
+            <a:picLocks noGrp="1" noChangeAspect="1"/>
+          </p:cNvPicPr>
+          <p:nvPr/>
+        </p:nvPicPr>
+        <p:blipFill>
+          <a:blip r:embed="rId2"/>
+          <a:stretch>
+            <a:fillRect/>
+          </a:stretch>
+        </p:blipFill>
+        <p:spPr bwMode="auto">
+          <a:xfrm>
+            <a:off x="2425700" y="1689100"/>
+            <a:ext cx="4279900" cy="2476500"/>
+          </a:xfrm>
+          <a:prstGeom prst="rect">
+            <a:avLst/>
+          </a:prstGeom>
+          <a:noFill/>
+          <a:ln w="9525">
+            <a:noFill/>
+            <a:headEnd/>
+            <a:tailEnd/>
+          </a:ln>
+        </p:spPr>
+      </p:pic>
+      <p:sp>
+        <p:nvSpPr>
+          <p:cNvPr id="1" name="TextBox 3"/>
+          <p:cNvSpPr txBox="1"/>
+          <p:nvPr/>
+        </p:nvSpPr>
+        <p:spPr>
+          <a:xfrm>
+            <a:off x="457200" y="4165600"/>
+            <a:ext cx="8229600" cy="508000"/>
+          </a:xfrm>
+          <a:prstGeom prst="rect">
+            <a:avLst/>
+          </a:prstGeom>
+          <a:noFill/>
+        </p:spPr>
+        <p:txBody>
+          <a:bodyPr/>
+          <a:lstStyle/>
+          <a:p>
+            <a:pPr lvl="0" indent="0" marL="0" algn="ctr">
               <a:buNone/>
             </a:pPr>
             <a:r>
-              <a:rPr b="1"/>
-              <a:t>Word/PPT</a:t>
-            </a:r>
-          </a:p>
-          <a:p>
-            <a:pPr lvl="0"/>
-            <a:r>
-              <a:rPr/>
-              <a:t>Hard to collaborate before O365</a:t>
-            </a:r>
-          </a:p>
-          <a:p>
-            <a:pPr lvl="0"/>
-            <a:r>
-              <a:rPr/>
-              <a:t>Hard to reproduce / auto-generate</a:t>
-            </a:r>
-          </a:p>
-        </p:txBody>
-      </p:sp>
-      <p:sp>
-        <p:nvSpPr>
-          <p:cNvPr id="4" name="Content Placeholder 3"/>
-          <p:cNvSpPr>
-            <a:spLocks noGrp="1"/>
-          </p:cNvSpPr>
-          <p:nvPr>
-            <p:ph idx="2" sz="half"/>
-          </p:nvPr>
-        </p:nvSpPr>
-        <p:spPr/>
-        <p:txBody>
-          <a:bodyPr/>
-          <a:lstStyle/>
-          <a:p>
-            <a:pPr lvl="0" indent="0" marL="0">
-              <a:spcBef>
-                <a:spcPts val="3000"/>
-              </a:spcBef>
-              <a:buNone/>
-            </a:pPr>
-            <a:r>
-              <a:rPr b="1"/>
-              <a:t>Jekyll</a:t>
-            </a:r>
-          </a:p>
-          <a:p>
-            <a:pPr lvl="0"/>
-            <a:r>
-              <a:rPr/>
-              <a:t>Great for sites</a:t>
-            </a:r>
-          </a:p>
-          <a:p>
-            <a:pPr lvl="0"/>
-            <a:r>
-              <a:rPr/>
-              <a:t>Not great for PPT, papers</a:t>
-            </a:r>
-          </a:p>
-          <a:p>
-            <a:pPr lvl="0" indent="0" marL="0">
-              <a:spcBef>
-                <a:spcPts val="3000"/>
-              </a:spcBef>
-              <a:buNone/>
-            </a:pPr>
-            <a:r>
-              <a:rPr b="1"/>
-              <a:t>RMarkdown</a:t>
-            </a:r>
-          </a:p>
-          <a:p>
-            <a:pPr lvl="0"/>
-            <a:r>
-              <a:rPr/>
-              <a:t>Great PDFs</a:t>
-            </a:r>
-          </a:p>
-          <a:p>
-            <a:pPr lvl="0"/>
-            <a:r>
-              <a:rPr/>
-              <a:t>Mostly good presentations</a:t>
-            </a:r>
-          </a:p>
-          <a:p>
-            <a:pPr lvl="0"/>
-            <a:r>
-              <a:rPr/>
-              <a:t>Hugo and </a:t>
-            </a:r>
-            <a:r>
-              <a:rPr>
-                <a:latin typeface="Courier"/>
-              </a:rPr>
-              <a:t>blogdown</a:t>
-            </a:r>
-            <a:r>
-              <a:rPr/>
-              <a:t> work well</a:t>
-            </a:r>
-          </a:p>
-          <a:p>
-            <a:pPr lvl="0"/>
-            <a:r>
-              <a:rPr/>
-              <a:t>Need to learn </a:t>
-            </a:r>
-            <a:r>
-              <a:rPr>
-                <a:latin typeface="Courier"/>
-              </a:rPr>
-              <a:t>R</a:t>
+              <a:rPr/>
+              <a:t>Quarto using Python</a:t>
             </a:r>
           </a:p>
         </p:txBody>
@@ -6444,7 +6943,13 @@
       </p:grpSpPr>
       <p:sp>
         <p:nvSpPr>
-          <p:cNvPr id="2" name="Title 1"/>
+          <p:cNvPr id="9" name="Title 1">
+            <a:extLst>
+              <a:ext uri="{FF2B5EF4-FFF2-40B4-BE49-F238E27FC236}">
+                <a16:creationId xmlns:a16="http://schemas.microsoft.com/office/drawing/2014/main" id="{039B6DB2-D068-C680-F293-31EEF2D13404}"/>
+              </a:ext>
+            </a:extLst>
+          </p:cNvPr>
           <p:cNvSpPr>
             <a:spLocks noGrp="1"/>
           </p:cNvSpPr>
@@ -6454,8 +6959,8 @@
         </p:nvSpPr>
         <p:spPr>
           <a:xfrm>
-            <a:off x="722313" y="3305176"/>
-            <a:ext cx="7772400" cy="1021556"/>
+            <a:off x="457200" y="205979"/>
+            <a:ext cx="8229600" cy="857250"/>
           </a:xfrm>
         </p:spPr>
         <p:txBody>
@@ -6467,7 +6972,92 @@
             </a:pPr>
             <a:r>
               <a:rPr/>
-              <a:t>Articles</a:t>
+              <a:t>But wait, there’s more!</a:t>
+            </a:r>
+          </a:p>
+        </p:txBody>
+      </p:sp>
+      <p:sp>
+        <p:nvSpPr>
+          <p:cNvPr id="4" name="Text Placeholder 3"/>
+          <p:cNvSpPr>
+            <a:spLocks noGrp="1"/>
+          </p:cNvSpPr>
+          <p:nvPr>
+            <p:ph idx="2" sz="half" type="body"/>
+          </p:nvPr>
+        </p:nvSpPr>
+        <p:spPr/>
+        <p:txBody>
+          <a:bodyPr/>
+          <a:lstStyle/>
+          <a:p>
+            <a:pPr lvl="0" indent="0" marL="0">
+              <a:buNone/>
+            </a:pPr>
+            <a:r>
+              <a:rPr/>
+              <a:t>Quarto can easily run pre-scripts and post-scripts. I frequenly use this to pre-process data and to automatically publish output to git repositories.</a:t>
+            </a:r>
+          </a:p>
+        </p:txBody>
+      </p:sp>
+      <p:pic>
+        <p:nvPicPr>
+          <p:cNvPr descr="fig:  images/mermaid2-quarto-scripts.png" id="0" name="Picture 1"/>
+          <p:cNvPicPr>
+            <a:picLocks noGrp="1" noChangeAspect="1"/>
+          </p:cNvPicPr>
+          <p:nvPr/>
+        </p:nvPicPr>
+        <p:blipFill>
+          <a:blip r:embed="rId2"/>
+          <a:stretch>
+            <a:fillRect/>
+          </a:stretch>
+        </p:blipFill>
+        <p:spPr bwMode="auto">
+          <a:xfrm>
+            <a:off x="1625600" y="1689100"/>
+            <a:ext cx="5892800" cy="2476500"/>
+          </a:xfrm>
+          <a:prstGeom prst="rect">
+            <a:avLst/>
+          </a:prstGeom>
+          <a:noFill/>
+          <a:ln w="9525">
+            <a:noFill/>
+            <a:headEnd/>
+            <a:tailEnd/>
+          </a:ln>
+        </p:spPr>
+      </p:pic>
+      <p:sp>
+        <p:nvSpPr>
+          <p:cNvPr id="1" name="TextBox 3"/>
+          <p:cNvSpPr txBox="1"/>
+          <p:nvPr/>
+        </p:nvSpPr>
+        <p:spPr>
+          <a:xfrm>
+            <a:off x="457200" y="4165600"/>
+            <a:ext cx="8229600" cy="508000"/>
+          </a:xfrm>
+          <a:prstGeom prst="rect">
+            <a:avLst/>
+          </a:prstGeom>
+          <a:noFill/>
+        </p:spPr>
+        <p:txBody>
+          <a:bodyPr/>
+          <a:lstStyle/>
+          <a:p>
+            <a:pPr lvl="0" indent="0" marL="0" algn="ctr">
+              <a:buNone/>
+            </a:pPr>
+            <a:r>
+              <a:rPr/>
+              <a:t>Scripts</a:t>
             </a:r>
           </a:p>
         </p:txBody>
@@ -6504,7 +7094,12 @@
             <p:ph type="title"/>
           </p:nvPr>
         </p:nvSpPr>
-        <p:spPr/>
+        <p:spPr>
+          <a:xfrm>
+            <a:off x="722313" y="3305176"/>
+            <a:ext cx="7772400" cy="1021556"/>
+          </a:xfrm>
+        </p:spPr>
         <p:txBody>
           <a:bodyPr/>
           <a:lstStyle/>
@@ -6514,32 +7109,7 @@
             </a:pPr>
             <a:r>
               <a:rPr/>
-              <a:t>Using Quarto to write articles</a:t>
-            </a:r>
-          </a:p>
-        </p:txBody>
-      </p:sp>
-      <p:sp>
-        <p:nvSpPr>
-          <p:cNvPr id="3" name="Content Placeholder 2"/>
-          <p:cNvSpPr>
-            <a:spLocks noGrp="1"/>
-          </p:cNvSpPr>
-          <p:nvPr>
-            <p:ph idx="1"/>
-          </p:nvPr>
-        </p:nvSpPr>
-        <p:spPr/>
-        <p:txBody>
-          <a:bodyPr/>
-          <a:lstStyle/>
-          <a:p>
-            <a:pPr lvl="0" indent="0" marL="0">
-              <a:buNone/>
-            </a:pPr>
-            <a:r>
-              <a:rPr/>
-              <a:t>Blah bleh blih</a:t>
+              <a:t>Using Quarto</a:t>
             </a:r>
           </a:p>
         </p:txBody>

</xml_diff>